<commit_message>
added renewed art and bug fixed infoMode
</commit_message>
<xml_diff>
--- a/GamePlan.pptx
+++ b/GamePlan.pptx
@@ -6,6 +6,7 @@
   </p:sldMasterIdLst>
   <p:sldIdLst>
     <p:sldId id="256" r:id="rId2"/>
+    <p:sldId id="257" r:id="rId3"/>
   </p:sldIdLst>
   <p:sldSz cx="12192000" cy="6858000"/>
   <p:notesSz cx="6858000" cy="9144000"/>
@@ -104,6 +105,11 @@
       </a:defRPr>
     </a:lvl9pPr>
   </p:defaultTextStyle>
+  <p:extLst>
+    <p:ext uri="{EFAFB233-063F-42B5-8137-9DF3F51BA10A}">
+      <p15:sldGuideLst xmlns:p15="http://schemas.microsoft.com/office/powerpoint/2012/main"/>
+    </p:ext>
+  </p:extLst>
 </p:presentation>
 </file>
 
@@ -256,7 +262,7 @@
           <a:p>
             <a:fld id="{1500088E-0961-43BE-9556-B4BDCC0CD05A}" type="datetimeFigureOut">
               <a:rPr lang="en-GB" smtClean="0"/>
-              <a:t>14/08/2020</a:t>
+              <a:t>19/08/2020</a:t>
             </a:fld>
             <a:endParaRPr lang="en-GB"/>
           </a:p>
@@ -456,7 +462,7 @@
           <a:p>
             <a:fld id="{1500088E-0961-43BE-9556-B4BDCC0CD05A}" type="datetimeFigureOut">
               <a:rPr lang="en-GB" smtClean="0"/>
-              <a:t>14/08/2020</a:t>
+              <a:t>19/08/2020</a:t>
             </a:fld>
             <a:endParaRPr lang="en-GB"/>
           </a:p>
@@ -666,7 +672,7 @@
           <a:p>
             <a:fld id="{1500088E-0961-43BE-9556-B4BDCC0CD05A}" type="datetimeFigureOut">
               <a:rPr lang="en-GB" smtClean="0"/>
-              <a:t>14/08/2020</a:t>
+              <a:t>19/08/2020</a:t>
             </a:fld>
             <a:endParaRPr lang="en-GB"/>
           </a:p>
@@ -866,7 +872,7 @@
           <a:p>
             <a:fld id="{1500088E-0961-43BE-9556-B4BDCC0CD05A}" type="datetimeFigureOut">
               <a:rPr lang="en-GB" smtClean="0"/>
-              <a:t>14/08/2020</a:t>
+              <a:t>19/08/2020</a:t>
             </a:fld>
             <a:endParaRPr lang="en-GB"/>
           </a:p>
@@ -1142,7 +1148,7 @@
           <a:p>
             <a:fld id="{1500088E-0961-43BE-9556-B4BDCC0CD05A}" type="datetimeFigureOut">
               <a:rPr lang="en-GB" smtClean="0"/>
-              <a:t>14/08/2020</a:t>
+              <a:t>19/08/2020</a:t>
             </a:fld>
             <a:endParaRPr lang="en-GB"/>
           </a:p>
@@ -1410,7 +1416,7 @@
           <a:p>
             <a:fld id="{1500088E-0961-43BE-9556-B4BDCC0CD05A}" type="datetimeFigureOut">
               <a:rPr lang="en-GB" smtClean="0"/>
-              <a:t>14/08/2020</a:t>
+              <a:t>19/08/2020</a:t>
             </a:fld>
             <a:endParaRPr lang="en-GB"/>
           </a:p>
@@ -1825,7 +1831,7 @@
           <a:p>
             <a:fld id="{1500088E-0961-43BE-9556-B4BDCC0CD05A}" type="datetimeFigureOut">
               <a:rPr lang="en-GB" smtClean="0"/>
-              <a:t>14/08/2020</a:t>
+              <a:t>19/08/2020</a:t>
             </a:fld>
             <a:endParaRPr lang="en-GB"/>
           </a:p>
@@ -1967,7 +1973,7 @@
           <a:p>
             <a:fld id="{1500088E-0961-43BE-9556-B4BDCC0CD05A}" type="datetimeFigureOut">
               <a:rPr lang="en-GB" smtClean="0"/>
-              <a:t>14/08/2020</a:t>
+              <a:t>19/08/2020</a:t>
             </a:fld>
             <a:endParaRPr lang="en-GB"/>
           </a:p>
@@ -2080,7 +2086,7 @@
           <a:p>
             <a:fld id="{1500088E-0961-43BE-9556-B4BDCC0CD05A}" type="datetimeFigureOut">
               <a:rPr lang="en-GB" smtClean="0"/>
-              <a:t>14/08/2020</a:t>
+              <a:t>19/08/2020</a:t>
             </a:fld>
             <a:endParaRPr lang="en-GB"/>
           </a:p>
@@ -2393,7 +2399,7 @@
           <a:p>
             <a:fld id="{1500088E-0961-43BE-9556-B4BDCC0CD05A}" type="datetimeFigureOut">
               <a:rPr lang="en-GB" smtClean="0"/>
-              <a:t>14/08/2020</a:t>
+              <a:t>19/08/2020</a:t>
             </a:fld>
             <a:endParaRPr lang="en-GB"/>
           </a:p>
@@ -2682,7 +2688,7 @@
           <a:p>
             <a:fld id="{1500088E-0961-43BE-9556-B4BDCC0CD05A}" type="datetimeFigureOut">
               <a:rPr lang="en-GB" smtClean="0"/>
-              <a:t>14/08/2020</a:t>
+              <a:t>19/08/2020</a:t>
             </a:fld>
             <a:endParaRPr lang="en-GB"/>
           </a:p>
@@ -2925,7 +2931,7 @@
           <a:p>
             <a:fld id="{1500088E-0961-43BE-9556-B4BDCC0CD05A}" type="datetimeFigureOut">
               <a:rPr lang="en-GB" smtClean="0"/>
-              <a:t>14/08/2020</a:t>
+              <a:t>19/08/2020</a:t>
             </a:fld>
             <a:endParaRPr lang="en-GB"/>
           </a:p>
@@ -4548,6 +4554,66 @@
 </p:sld>
 </file>
 
+<file path=ppt/slides/slide2.xml><?xml version="1.0" encoding="utf-8"?>
+<p:sld xmlns:a="http://schemas.openxmlformats.org/drawingml/2006/main" xmlns:r="http://schemas.openxmlformats.org/officeDocument/2006/relationships" xmlns:p="http://schemas.openxmlformats.org/presentationml/2006/main">
+  <p:cSld>
+    <p:spTree>
+      <p:nvGrpSpPr>
+        <p:cNvPr id="1" name=""/>
+        <p:cNvGrpSpPr/>
+        <p:nvPr/>
+      </p:nvGrpSpPr>
+      <p:grpSpPr>
+        <a:xfrm>
+          <a:off x="0" y="0"/>
+          <a:ext cx="0" cy="0"/>
+          <a:chOff x="0" y="0"/>
+          <a:chExt cx="0" cy="0"/>
+        </a:xfrm>
+      </p:grpSpPr>
+      <p:pic>
+        <p:nvPicPr>
+          <p:cNvPr id="10" name="Picture 9">
+            <a:extLst>
+              <a:ext uri="{FF2B5EF4-FFF2-40B4-BE49-F238E27FC236}">
+                <a16:creationId xmlns:a16="http://schemas.microsoft.com/office/drawing/2014/main" id="{C6FE2C43-68B0-4864-BAC3-EEBCF8A24027}"/>
+              </a:ext>
+            </a:extLst>
+          </p:cNvPr>
+          <p:cNvPicPr>
+            <a:picLocks noChangeAspect="1"/>
+          </p:cNvPicPr>
+          <p:nvPr/>
+        </p:nvPicPr>
+        <p:blipFill>
+          <a:blip r:embed="rId2"/>
+          <a:stretch>
+            <a:fillRect/>
+          </a:stretch>
+        </p:blipFill>
+        <p:spPr>
+          <a:xfrm>
+            <a:off x="0" y="200217"/>
+            <a:ext cx="12192000" cy="6457566"/>
+          </a:xfrm>
+          <a:prstGeom prst="rect">
+            <a:avLst/>
+          </a:prstGeom>
+        </p:spPr>
+      </p:pic>
+    </p:spTree>
+    <p:extLst>
+      <p:ext uri="{BB962C8B-B14F-4D97-AF65-F5344CB8AC3E}">
+        <p14:creationId xmlns:p14="http://schemas.microsoft.com/office/powerpoint/2010/main" val="4027536709"/>
+      </p:ext>
+    </p:extLst>
+  </p:cSld>
+  <p:clrMapOvr>
+    <a:masterClrMapping/>
+  </p:clrMapOvr>
+</p:sld>
+</file>
+
 <file path=ppt/theme/theme1.xml><?xml version="1.0" encoding="utf-8"?>
 <a:theme xmlns:a="http://schemas.openxmlformats.org/drawingml/2006/main" name="Office Theme">
   <a:themeElements>

</xml_diff>

<commit_message>
added fluid and power functionality and UI
</commit_message>
<xml_diff>
--- a/GamePlan.pptx
+++ b/GamePlan.pptx
@@ -7,6 +7,7 @@
   <p:sldIdLst>
     <p:sldId id="256" r:id="rId2"/>
     <p:sldId id="257" r:id="rId3"/>
+    <p:sldId id="258" r:id="rId4"/>
   </p:sldIdLst>
   <p:sldSz cx="12192000" cy="6858000"/>
   <p:notesSz cx="6858000" cy="9144000"/>
@@ -262,7 +263,7 @@
           <a:p>
             <a:fld id="{1500088E-0961-43BE-9556-B4BDCC0CD05A}" type="datetimeFigureOut">
               <a:rPr lang="en-GB" smtClean="0"/>
-              <a:t>19/08/2020</a:t>
+              <a:t>08/09/2020</a:t>
             </a:fld>
             <a:endParaRPr lang="en-GB"/>
           </a:p>
@@ -462,7 +463,7 @@
           <a:p>
             <a:fld id="{1500088E-0961-43BE-9556-B4BDCC0CD05A}" type="datetimeFigureOut">
               <a:rPr lang="en-GB" smtClean="0"/>
-              <a:t>19/08/2020</a:t>
+              <a:t>08/09/2020</a:t>
             </a:fld>
             <a:endParaRPr lang="en-GB"/>
           </a:p>
@@ -672,7 +673,7 @@
           <a:p>
             <a:fld id="{1500088E-0961-43BE-9556-B4BDCC0CD05A}" type="datetimeFigureOut">
               <a:rPr lang="en-GB" smtClean="0"/>
-              <a:t>19/08/2020</a:t>
+              <a:t>08/09/2020</a:t>
             </a:fld>
             <a:endParaRPr lang="en-GB"/>
           </a:p>
@@ -872,7 +873,7 @@
           <a:p>
             <a:fld id="{1500088E-0961-43BE-9556-B4BDCC0CD05A}" type="datetimeFigureOut">
               <a:rPr lang="en-GB" smtClean="0"/>
-              <a:t>19/08/2020</a:t>
+              <a:t>08/09/2020</a:t>
             </a:fld>
             <a:endParaRPr lang="en-GB"/>
           </a:p>
@@ -1148,7 +1149,7 @@
           <a:p>
             <a:fld id="{1500088E-0961-43BE-9556-B4BDCC0CD05A}" type="datetimeFigureOut">
               <a:rPr lang="en-GB" smtClean="0"/>
-              <a:t>19/08/2020</a:t>
+              <a:t>08/09/2020</a:t>
             </a:fld>
             <a:endParaRPr lang="en-GB"/>
           </a:p>
@@ -1416,7 +1417,7 @@
           <a:p>
             <a:fld id="{1500088E-0961-43BE-9556-B4BDCC0CD05A}" type="datetimeFigureOut">
               <a:rPr lang="en-GB" smtClean="0"/>
-              <a:t>19/08/2020</a:t>
+              <a:t>08/09/2020</a:t>
             </a:fld>
             <a:endParaRPr lang="en-GB"/>
           </a:p>
@@ -1831,7 +1832,7 @@
           <a:p>
             <a:fld id="{1500088E-0961-43BE-9556-B4BDCC0CD05A}" type="datetimeFigureOut">
               <a:rPr lang="en-GB" smtClean="0"/>
-              <a:t>19/08/2020</a:t>
+              <a:t>08/09/2020</a:t>
             </a:fld>
             <a:endParaRPr lang="en-GB"/>
           </a:p>
@@ -1973,7 +1974,7 @@
           <a:p>
             <a:fld id="{1500088E-0961-43BE-9556-B4BDCC0CD05A}" type="datetimeFigureOut">
               <a:rPr lang="en-GB" smtClean="0"/>
-              <a:t>19/08/2020</a:t>
+              <a:t>08/09/2020</a:t>
             </a:fld>
             <a:endParaRPr lang="en-GB"/>
           </a:p>
@@ -2086,7 +2087,7 @@
           <a:p>
             <a:fld id="{1500088E-0961-43BE-9556-B4BDCC0CD05A}" type="datetimeFigureOut">
               <a:rPr lang="en-GB" smtClean="0"/>
-              <a:t>19/08/2020</a:t>
+              <a:t>08/09/2020</a:t>
             </a:fld>
             <a:endParaRPr lang="en-GB"/>
           </a:p>
@@ -2399,7 +2400,7 @@
           <a:p>
             <a:fld id="{1500088E-0961-43BE-9556-B4BDCC0CD05A}" type="datetimeFigureOut">
               <a:rPr lang="en-GB" smtClean="0"/>
-              <a:t>19/08/2020</a:t>
+              <a:t>08/09/2020</a:t>
             </a:fld>
             <a:endParaRPr lang="en-GB"/>
           </a:p>
@@ -2688,7 +2689,7 @@
           <a:p>
             <a:fld id="{1500088E-0961-43BE-9556-B4BDCC0CD05A}" type="datetimeFigureOut">
               <a:rPr lang="en-GB" smtClean="0"/>
-              <a:t>19/08/2020</a:t>
+              <a:t>08/09/2020</a:t>
             </a:fld>
             <a:endParaRPr lang="en-GB"/>
           </a:p>
@@ -2931,7 +2932,7 @@
           <a:p>
             <a:fld id="{1500088E-0961-43BE-9556-B4BDCC0CD05A}" type="datetimeFigureOut">
               <a:rPr lang="en-GB" smtClean="0"/>
-              <a:t>19/08/2020</a:t>
+              <a:t>08/09/2020</a:t>
             </a:fld>
             <a:endParaRPr lang="en-GB"/>
           </a:p>
@@ -4614,6 +4615,582 @@
 </p:sld>
 </file>
 
+<file path=ppt/slides/slide3.xml><?xml version="1.0" encoding="utf-8"?>
+<p:sld xmlns:a="http://schemas.openxmlformats.org/drawingml/2006/main" xmlns:r="http://schemas.openxmlformats.org/officeDocument/2006/relationships" xmlns:p="http://schemas.openxmlformats.org/presentationml/2006/main">
+  <p:cSld>
+    <p:spTree>
+      <p:nvGrpSpPr>
+        <p:cNvPr id="1" name=""/>
+        <p:cNvGrpSpPr/>
+        <p:nvPr/>
+      </p:nvGrpSpPr>
+      <p:grpSpPr>
+        <a:xfrm>
+          <a:off x="0" y="0"/>
+          <a:ext cx="0" cy="0"/>
+          <a:chOff x="0" y="0"/>
+          <a:chExt cx="0" cy="0"/>
+        </a:xfrm>
+      </p:grpSpPr>
+      <p:sp>
+        <p:nvSpPr>
+          <p:cNvPr id="2" name="Rectangle 1">
+            <a:extLst>
+              <a:ext uri="{FF2B5EF4-FFF2-40B4-BE49-F238E27FC236}">
+                <a16:creationId xmlns:a16="http://schemas.microsoft.com/office/drawing/2014/main" id="{B7326FE7-CC03-4AEC-9BC6-B7E40AD5C16B}"/>
+              </a:ext>
+            </a:extLst>
+          </p:cNvPr>
+          <p:cNvSpPr/>
+          <p:nvPr/>
+        </p:nvSpPr>
+        <p:spPr>
+          <a:xfrm>
+            <a:off x="908384" y="1413711"/>
+            <a:ext cx="9679405" cy="4193005"/>
+          </a:xfrm>
+          <a:prstGeom prst="rect">
+            <a:avLst/>
+          </a:prstGeom>
+        </p:spPr>
+        <p:style>
+          <a:lnRef idx="2">
+            <a:schemeClr val="accent3">
+              <a:shade val="50000"/>
+            </a:schemeClr>
+          </a:lnRef>
+          <a:fillRef idx="1">
+            <a:schemeClr val="accent3"/>
+          </a:fillRef>
+          <a:effectRef idx="0">
+            <a:schemeClr val="accent3"/>
+          </a:effectRef>
+          <a:fontRef idx="minor">
+            <a:schemeClr val="lt1"/>
+          </a:fontRef>
+        </p:style>
+        <p:txBody>
+          <a:bodyPr rtlCol="0" anchor="ctr"/>
+          <a:lstStyle/>
+          <a:p>
+            <a:pPr algn="ctr"/>
+            <a:endParaRPr lang="en-GB"/>
+          </a:p>
+        </p:txBody>
+      </p:sp>
+      <p:pic>
+        <p:nvPicPr>
+          <p:cNvPr id="4" name="Picture 3" descr="A picture containing table, bird&#10;&#10;Description automatically generated">
+            <a:extLst>
+              <a:ext uri="{FF2B5EF4-FFF2-40B4-BE49-F238E27FC236}">
+                <a16:creationId xmlns:a16="http://schemas.microsoft.com/office/drawing/2014/main" id="{1123EFE4-7D81-4596-B1E6-E3EE685570F4}"/>
+              </a:ext>
+            </a:extLst>
+          </p:cNvPr>
+          <p:cNvPicPr>
+            <a:picLocks noChangeAspect="1"/>
+          </p:cNvPicPr>
+          <p:nvPr/>
+        </p:nvPicPr>
+        <p:blipFill>
+          <a:blip r:embed="rId2">
+            <a:extLst>
+              <a:ext uri="{BEBA8EAE-BF5A-486C-A8C5-ECC9F3942E4B}">
+                <a14:imgProps xmlns:a14="http://schemas.microsoft.com/office/drawing/2010/main">
+                  <a14:imgLayer r:embed="rId3">
+                    <a14:imgEffect>
+                      <a14:sharpenSoften amount="50000"/>
+                    </a14:imgEffect>
+                  </a14:imgLayer>
+                </a14:imgProps>
+              </a:ext>
+              <a:ext uri="{28A0092B-C50C-407E-A947-70E740481C1C}">
+                <a14:useLocalDpi xmlns:a14="http://schemas.microsoft.com/office/drawing/2010/main" val="0"/>
+              </a:ext>
+            </a:extLst>
+          </a:blip>
+          <a:stretch>
+            <a:fillRect/>
+          </a:stretch>
+        </p:blipFill>
+        <p:spPr>
+          <a:xfrm>
+            <a:off x="3163067" y="4292987"/>
+            <a:ext cx="1166339" cy="1166339"/>
+          </a:xfrm>
+          <a:prstGeom prst="rect">
+            <a:avLst/>
+          </a:prstGeom>
+        </p:spPr>
+      </p:pic>
+      <p:sp>
+        <p:nvSpPr>
+          <p:cNvPr id="5" name="Arrow: Right 4">
+            <a:extLst>
+              <a:ext uri="{FF2B5EF4-FFF2-40B4-BE49-F238E27FC236}">
+                <a16:creationId xmlns:a16="http://schemas.microsoft.com/office/drawing/2014/main" id="{AB63425B-13FC-4164-AB58-C998CA447242}"/>
+              </a:ext>
+            </a:extLst>
+          </p:cNvPr>
+          <p:cNvSpPr/>
+          <p:nvPr/>
+        </p:nvSpPr>
+        <p:spPr>
+          <a:xfrm>
+            <a:off x="4696925" y="3191376"/>
+            <a:ext cx="1782037" cy="583350"/>
+          </a:xfrm>
+          <a:prstGeom prst="rightArrow">
+            <a:avLst/>
+          </a:prstGeom>
+        </p:spPr>
+        <p:style>
+          <a:lnRef idx="2">
+            <a:schemeClr val="accent4">
+              <a:shade val="50000"/>
+            </a:schemeClr>
+          </a:lnRef>
+          <a:fillRef idx="1">
+            <a:schemeClr val="accent4"/>
+          </a:fillRef>
+          <a:effectRef idx="0">
+            <a:schemeClr val="accent4"/>
+          </a:effectRef>
+          <a:fontRef idx="minor">
+            <a:schemeClr val="lt1"/>
+          </a:fontRef>
+        </p:style>
+        <p:txBody>
+          <a:bodyPr rtlCol="0" anchor="ctr"/>
+          <a:lstStyle/>
+          <a:p>
+            <a:pPr algn="ctr"/>
+            <a:endParaRPr lang="en-GB"/>
+          </a:p>
+        </p:txBody>
+      </p:sp>
+      <p:sp>
+        <p:nvSpPr>
+          <p:cNvPr id="9" name="Rectangle 8">
+            <a:extLst>
+              <a:ext uri="{FF2B5EF4-FFF2-40B4-BE49-F238E27FC236}">
+                <a16:creationId xmlns:a16="http://schemas.microsoft.com/office/drawing/2014/main" id="{863E9446-74D5-46AC-8ADB-C8487FEF14AC}"/>
+              </a:ext>
+            </a:extLst>
+          </p:cNvPr>
+          <p:cNvSpPr/>
+          <p:nvPr/>
+        </p:nvSpPr>
+        <p:spPr>
+          <a:xfrm>
+            <a:off x="2119034" y="1561095"/>
+            <a:ext cx="940540" cy="3898231"/>
+          </a:xfrm>
+          <a:prstGeom prst="rect">
+            <a:avLst/>
+          </a:prstGeom>
+        </p:spPr>
+        <p:style>
+          <a:lnRef idx="2">
+            <a:schemeClr val="accent5">
+              <a:shade val="50000"/>
+            </a:schemeClr>
+          </a:lnRef>
+          <a:fillRef idx="1">
+            <a:schemeClr val="accent5"/>
+          </a:fillRef>
+          <a:effectRef idx="0">
+            <a:schemeClr val="accent5"/>
+          </a:effectRef>
+          <a:fontRef idx="minor">
+            <a:schemeClr val="lt1"/>
+          </a:fontRef>
+        </p:style>
+        <p:txBody>
+          <a:bodyPr rtlCol="0" anchor="ctr"/>
+          <a:lstStyle/>
+          <a:p>
+            <a:pPr algn="ctr"/>
+            <a:endParaRPr lang="en-GB"/>
+          </a:p>
+        </p:txBody>
+      </p:sp>
+      <p:pic>
+        <p:nvPicPr>
+          <p:cNvPr id="13" name="Picture 12" descr="A picture containing table, bird&#10;&#10;Description automatically generated">
+            <a:extLst>
+              <a:ext uri="{FF2B5EF4-FFF2-40B4-BE49-F238E27FC236}">
+                <a16:creationId xmlns:a16="http://schemas.microsoft.com/office/drawing/2014/main" id="{DBF9F846-724C-4625-9B27-62982B4AC635}"/>
+              </a:ext>
+            </a:extLst>
+          </p:cNvPr>
+          <p:cNvPicPr>
+            <a:picLocks noChangeAspect="1"/>
+          </p:cNvPicPr>
+          <p:nvPr/>
+        </p:nvPicPr>
+        <p:blipFill>
+          <a:blip r:embed="rId2">
+            <a:extLst>
+              <a:ext uri="{BEBA8EAE-BF5A-486C-A8C5-ECC9F3942E4B}">
+                <a14:imgProps xmlns:a14="http://schemas.microsoft.com/office/drawing/2010/main">
+                  <a14:imgLayer r:embed="rId3">
+                    <a14:imgEffect>
+                      <a14:sharpenSoften amount="50000"/>
+                    </a14:imgEffect>
+                  </a14:imgLayer>
+                </a14:imgProps>
+              </a:ext>
+              <a:ext uri="{28A0092B-C50C-407E-A947-70E740481C1C}">
+                <a14:useLocalDpi xmlns:a14="http://schemas.microsoft.com/office/drawing/2010/main" val="0"/>
+              </a:ext>
+            </a:extLst>
+          </a:blip>
+          <a:stretch>
+            <a:fillRect/>
+          </a:stretch>
+        </p:blipFill>
+        <p:spPr>
+          <a:xfrm>
+            <a:off x="3163066" y="2927040"/>
+            <a:ext cx="1166339" cy="1166339"/>
+          </a:xfrm>
+          <a:prstGeom prst="rect">
+            <a:avLst/>
+          </a:prstGeom>
+        </p:spPr>
+      </p:pic>
+      <p:pic>
+        <p:nvPicPr>
+          <p:cNvPr id="14" name="Picture 13" descr="A picture containing table, bird&#10;&#10;Description automatically generated">
+            <a:extLst>
+              <a:ext uri="{FF2B5EF4-FFF2-40B4-BE49-F238E27FC236}">
+                <a16:creationId xmlns:a16="http://schemas.microsoft.com/office/drawing/2014/main" id="{CFA64E30-2FA7-4C78-9EE6-E09D11255D8A}"/>
+              </a:ext>
+            </a:extLst>
+          </p:cNvPr>
+          <p:cNvPicPr>
+            <a:picLocks noChangeAspect="1"/>
+          </p:cNvPicPr>
+          <p:nvPr/>
+        </p:nvPicPr>
+        <p:blipFill>
+          <a:blip r:embed="rId2">
+            <a:extLst>
+              <a:ext uri="{BEBA8EAE-BF5A-486C-A8C5-ECC9F3942E4B}">
+                <a14:imgProps xmlns:a14="http://schemas.microsoft.com/office/drawing/2010/main">
+                  <a14:imgLayer r:embed="rId3">
+                    <a14:imgEffect>
+                      <a14:sharpenSoften amount="50000"/>
+                    </a14:imgEffect>
+                  </a14:imgLayer>
+                </a14:imgProps>
+              </a:ext>
+              <a:ext uri="{28A0092B-C50C-407E-A947-70E740481C1C}">
+                <a14:useLocalDpi xmlns:a14="http://schemas.microsoft.com/office/drawing/2010/main" val="0"/>
+              </a:ext>
+            </a:extLst>
+          </a:blip>
+          <a:stretch>
+            <a:fillRect/>
+          </a:stretch>
+        </p:blipFill>
+        <p:spPr>
+          <a:xfrm>
+            <a:off x="3163066" y="1561095"/>
+            <a:ext cx="1166339" cy="1166339"/>
+          </a:xfrm>
+          <a:prstGeom prst="rect">
+            <a:avLst/>
+          </a:prstGeom>
+        </p:spPr>
+      </p:pic>
+      <p:sp>
+        <p:nvSpPr>
+          <p:cNvPr id="15" name="Rectangle 14">
+            <a:extLst>
+              <a:ext uri="{FF2B5EF4-FFF2-40B4-BE49-F238E27FC236}">
+                <a16:creationId xmlns:a16="http://schemas.microsoft.com/office/drawing/2014/main" id="{81A1EBED-46AD-40F7-98E9-9D7A3A390316}"/>
+              </a:ext>
+            </a:extLst>
+          </p:cNvPr>
+          <p:cNvSpPr/>
+          <p:nvPr/>
+        </p:nvSpPr>
+        <p:spPr>
+          <a:xfrm>
+            <a:off x="1075003" y="1561096"/>
+            <a:ext cx="940540" cy="3898231"/>
+          </a:xfrm>
+          <a:prstGeom prst="rect">
+            <a:avLst/>
+          </a:prstGeom>
+        </p:spPr>
+        <p:style>
+          <a:lnRef idx="2">
+            <a:schemeClr val="accent2">
+              <a:shade val="50000"/>
+            </a:schemeClr>
+          </a:lnRef>
+          <a:fillRef idx="1">
+            <a:schemeClr val="accent2"/>
+          </a:fillRef>
+          <a:effectRef idx="0">
+            <a:schemeClr val="accent2"/>
+          </a:effectRef>
+          <a:fontRef idx="minor">
+            <a:schemeClr val="lt1"/>
+          </a:fontRef>
+        </p:style>
+        <p:txBody>
+          <a:bodyPr rtlCol="0" anchor="ctr"/>
+          <a:lstStyle/>
+          <a:p>
+            <a:pPr algn="ctr"/>
+            <a:endParaRPr lang="en-GB"/>
+          </a:p>
+        </p:txBody>
+      </p:sp>
+      <p:pic>
+        <p:nvPicPr>
+          <p:cNvPr id="16" name="Picture 15" descr="A picture containing table, bird&#10;&#10;Description automatically generated">
+            <a:extLst>
+              <a:ext uri="{FF2B5EF4-FFF2-40B4-BE49-F238E27FC236}">
+                <a16:creationId xmlns:a16="http://schemas.microsoft.com/office/drawing/2014/main" id="{63C3AF37-92BE-40D7-A800-34B6283B5BA7}"/>
+              </a:ext>
+            </a:extLst>
+          </p:cNvPr>
+          <p:cNvPicPr>
+            <a:picLocks noChangeAspect="1"/>
+          </p:cNvPicPr>
+          <p:nvPr/>
+        </p:nvPicPr>
+        <p:blipFill>
+          <a:blip r:embed="rId2">
+            <a:extLst>
+              <a:ext uri="{BEBA8EAE-BF5A-486C-A8C5-ECC9F3942E4B}">
+                <a14:imgProps xmlns:a14="http://schemas.microsoft.com/office/drawing/2010/main">
+                  <a14:imgLayer r:embed="rId3">
+                    <a14:imgEffect>
+                      <a14:sharpenSoften amount="50000"/>
+                    </a14:imgEffect>
+                  </a14:imgLayer>
+                </a14:imgProps>
+              </a:ext>
+              <a:ext uri="{28A0092B-C50C-407E-A947-70E740481C1C}">
+                <a14:useLocalDpi xmlns:a14="http://schemas.microsoft.com/office/drawing/2010/main" val="0"/>
+              </a:ext>
+            </a:extLst>
+          </a:blip>
+          <a:stretch>
+            <a:fillRect/>
+          </a:stretch>
+        </p:blipFill>
+        <p:spPr>
+          <a:xfrm>
+            <a:off x="7009667" y="4292987"/>
+            <a:ext cx="1166339" cy="1166339"/>
+          </a:xfrm>
+          <a:prstGeom prst="rect">
+            <a:avLst/>
+          </a:prstGeom>
+        </p:spPr>
+      </p:pic>
+      <p:sp>
+        <p:nvSpPr>
+          <p:cNvPr id="17" name="Rectangle 16">
+            <a:extLst>
+              <a:ext uri="{FF2B5EF4-FFF2-40B4-BE49-F238E27FC236}">
+                <a16:creationId xmlns:a16="http://schemas.microsoft.com/office/drawing/2014/main" id="{811FA6C5-1C35-41D0-85C1-CC1B8A4D6661}"/>
+              </a:ext>
+            </a:extLst>
+          </p:cNvPr>
+          <p:cNvSpPr/>
+          <p:nvPr/>
+        </p:nvSpPr>
+        <p:spPr>
+          <a:xfrm>
+            <a:off x="8279496" y="1561095"/>
+            <a:ext cx="940540" cy="3898231"/>
+          </a:xfrm>
+          <a:prstGeom prst="rect">
+            <a:avLst/>
+          </a:prstGeom>
+        </p:spPr>
+        <p:style>
+          <a:lnRef idx="2">
+            <a:schemeClr val="accent5">
+              <a:shade val="50000"/>
+            </a:schemeClr>
+          </a:lnRef>
+          <a:fillRef idx="1">
+            <a:schemeClr val="accent5"/>
+          </a:fillRef>
+          <a:effectRef idx="0">
+            <a:schemeClr val="accent5"/>
+          </a:effectRef>
+          <a:fontRef idx="minor">
+            <a:schemeClr val="lt1"/>
+          </a:fontRef>
+        </p:style>
+        <p:txBody>
+          <a:bodyPr rtlCol="0" anchor="ctr"/>
+          <a:lstStyle/>
+          <a:p>
+            <a:pPr algn="ctr"/>
+            <a:endParaRPr lang="en-GB"/>
+          </a:p>
+        </p:txBody>
+      </p:sp>
+      <p:pic>
+        <p:nvPicPr>
+          <p:cNvPr id="18" name="Picture 17" descr="A picture containing table, bird&#10;&#10;Description automatically generated">
+            <a:extLst>
+              <a:ext uri="{FF2B5EF4-FFF2-40B4-BE49-F238E27FC236}">
+                <a16:creationId xmlns:a16="http://schemas.microsoft.com/office/drawing/2014/main" id="{47BF65F5-8E60-4FDB-9B84-9659B9DA5181}"/>
+              </a:ext>
+            </a:extLst>
+          </p:cNvPr>
+          <p:cNvPicPr>
+            <a:picLocks noChangeAspect="1"/>
+          </p:cNvPicPr>
+          <p:nvPr/>
+        </p:nvPicPr>
+        <p:blipFill>
+          <a:blip r:embed="rId2">
+            <a:extLst>
+              <a:ext uri="{BEBA8EAE-BF5A-486C-A8C5-ECC9F3942E4B}">
+                <a14:imgProps xmlns:a14="http://schemas.microsoft.com/office/drawing/2010/main">
+                  <a14:imgLayer r:embed="rId3">
+                    <a14:imgEffect>
+                      <a14:sharpenSoften amount="50000"/>
+                    </a14:imgEffect>
+                  </a14:imgLayer>
+                </a14:imgProps>
+              </a:ext>
+              <a:ext uri="{28A0092B-C50C-407E-A947-70E740481C1C}">
+                <a14:useLocalDpi xmlns:a14="http://schemas.microsoft.com/office/drawing/2010/main" val="0"/>
+              </a:ext>
+            </a:extLst>
+          </a:blip>
+          <a:stretch>
+            <a:fillRect/>
+          </a:stretch>
+        </p:blipFill>
+        <p:spPr>
+          <a:xfrm>
+            <a:off x="7009666" y="2927040"/>
+            <a:ext cx="1166339" cy="1166339"/>
+          </a:xfrm>
+          <a:prstGeom prst="rect">
+            <a:avLst/>
+          </a:prstGeom>
+        </p:spPr>
+      </p:pic>
+      <p:pic>
+        <p:nvPicPr>
+          <p:cNvPr id="19" name="Picture 18" descr="A picture containing table, bird&#10;&#10;Description automatically generated">
+            <a:extLst>
+              <a:ext uri="{FF2B5EF4-FFF2-40B4-BE49-F238E27FC236}">
+                <a16:creationId xmlns:a16="http://schemas.microsoft.com/office/drawing/2014/main" id="{9D850FBD-8BA0-461D-8BAB-8A753FB6546C}"/>
+              </a:ext>
+            </a:extLst>
+          </p:cNvPr>
+          <p:cNvPicPr>
+            <a:picLocks noChangeAspect="1"/>
+          </p:cNvPicPr>
+          <p:nvPr/>
+        </p:nvPicPr>
+        <p:blipFill>
+          <a:blip r:embed="rId2">
+            <a:extLst>
+              <a:ext uri="{BEBA8EAE-BF5A-486C-A8C5-ECC9F3942E4B}">
+                <a14:imgProps xmlns:a14="http://schemas.microsoft.com/office/drawing/2010/main">
+                  <a14:imgLayer r:embed="rId3">
+                    <a14:imgEffect>
+                      <a14:sharpenSoften amount="50000"/>
+                    </a14:imgEffect>
+                  </a14:imgLayer>
+                </a14:imgProps>
+              </a:ext>
+              <a:ext uri="{28A0092B-C50C-407E-A947-70E740481C1C}">
+                <a14:useLocalDpi xmlns:a14="http://schemas.microsoft.com/office/drawing/2010/main" val="0"/>
+              </a:ext>
+            </a:extLst>
+          </a:blip>
+          <a:stretch>
+            <a:fillRect/>
+          </a:stretch>
+        </p:blipFill>
+        <p:spPr>
+          <a:xfrm>
+            <a:off x="7009666" y="1561095"/>
+            <a:ext cx="1166339" cy="1166339"/>
+          </a:xfrm>
+          <a:prstGeom prst="rect">
+            <a:avLst/>
+          </a:prstGeom>
+        </p:spPr>
+      </p:pic>
+      <p:sp>
+        <p:nvSpPr>
+          <p:cNvPr id="20" name="Rectangle 19">
+            <a:extLst>
+              <a:ext uri="{FF2B5EF4-FFF2-40B4-BE49-F238E27FC236}">
+                <a16:creationId xmlns:a16="http://schemas.microsoft.com/office/drawing/2014/main" id="{05F0F75E-E205-4FCF-9510-9CD61117466B}"/>
+              </a:ext>
+            </a:extLst>
+          </p:cNvPr>
+          <p:cNvSpPr/>
+          <p:nvPr/>
+        </p:nvSpPr>
+        <p:spPr>
+          <a:xfrm>
+            <a:off x="9323526" y="1561095"/>
+            <a:ext cx="940540" cy="3898231"/>
+          </a:xfrm>
+          <a:prstGeom prst="rect">
+            <a:avLst/>
+          </a:prstGeom>
+        </p:spPr>
+        <p:style>
+          <a:lnRef idx="2">
+            <a:schemeClr val="accent2">
+              <a:shade val="50000"/>
+            </a:schemeClr>
+          </a:lnRef>
+          <a:fillRef idx="1">
+            <a:schemeClr val="accent2"/>
+          </a:fillRef>
+          <a:effectRef idx="0">
+            <a:schemeClr val="accent2"/>
+          </a:effectRef>
+          <a:fontRef idx="minor">
+            <a:schemeClr val="lt1"/>
+          </a:fontRef>
+        </p:style>
+        <p:txBody>
+          <a:bodyPr rtlCol="0" anchor="ctr"/>
+          <a:lstStyle/>
+          <a:p>
+            <a:pPr algn="ctr"/>
+            <a:endParaRPr lang="en-GB"/>
+          </a:p>
+        </p:txBody>
+      </p:sp>
+    </p:spTree>
+    <p:extLst>
+      <p:ext uri="{BB962C8B-B14F-4D97-AF65-F5344CB8AC3E}">
+        <p14:creationId xmlns:p14="http://schemas.microsoft.com/office/powerpoint/2010/main" val="728150947"/>
+      </p:ext>
+    </p:extLst>
+  </p:cSld>
+  <p:clrMapOvr>
+    <a:masterClrMapping/>
+  </p:clrMapOvr>
+</p:sld>
+</file>
+
 <file path=ppt/theme/theme1.xml><?xml version="1.0" encoding="utf-8"?>
 <a:theme xmlns:a="http://schemas.openxmlformats.org/drawingml/2006/main" name="Office Theme">
   <a:themeElements>

</xml_diff>